<commit_message>
add feature and update more enemy
</commit_message>
<xml_diff>
--- a/gallaga_project/gallaga2ppt.pptx
+++ b/gallaga_project/gallaga2ppt.pptx
@@ -6851,14 +6851,14 @@
             <p:ph idx="1"/>
             <p:extLst>
               <p:ext uri="{D42A27DB-BD31-4B8C-83A1-F6EECF244321}">
-                <p14:modId xmlns:p14="http://schemas.microsoft.com/office/powerpoint/2010/main" val="1975583047"/>
+                <p14:modId xmlns:p14="http://schemas.microsoft.com/office/powerpoint/2010/main" val="2491379795"/>
               </p:ext>
             </p:extLst>
           </p:nvPr>
         </p:nvGraphicFramePr>
         <p:xfrm>
-          <a:off x="144378" y="1275348"/>
-          <a:ext cx="11903244" cy="4519613"/>
+          <a:off x="142790" y="2070677"/>
+          <a:ext cx="11903244" cy="4052083"/>
         </p:xfrm>
         <a:graphic>
           <a:graphicData uri="http://schemas.openxmlformats.org/drawingml/2006/table">
@@ -6889,7 +6889,7 @@
                   </a:extLst>
                 </a:gridCol>
               </a:tblGrid>
-              <a:tr h="954512">
+              <a:tr h="332096">
                 <a:tc rowSpan="2">
                   <a:txBody>
                     <a:bodyPr/>
@@ -6922,27 +6922,7 @@
                             <a:schemeClr val="bg1"/>
                           </a:solidFill>
                         </a:rPr>
-                        <a:t>/</a:t>
-                      </a:r>
-                      <a:endParaRPr lang="ko-KR" altLang="en-US" sz="2400" b="0" normalizeH="0" dirty="0">
-                        <a:solidFill>
-                          <a:schemeClr val="bg1"/>
-                        </a:solidFill>
-                      </a:endParaRPr>
-                    </a:p>
-                    <a:p>
-                      <a:pPr algn="ctr" latinLnBrk="1">
-                        <a:lnSpc>
-                          <a:spcPct val="150000"/>
-                        </a:lnSpc>
-                      </a:pPr>
-                      <a:r>
-                        <a:rPr lang="en-US" altLang="ko-KR" sz="2400" b="0" normalizeH="0" dirty="0">
-                          <a:solidFill>
-                            <a:schemeClr val="bg1"/>
-                          </a:solidFill>
-                        </a:rPr>
-                        <a:t>2</a:t>
+                        <a:t>/2</a:t>
                       </a:r>
                       <a:r>
                         <a:rPr lang="ko-KR" altLang="en-US" sz="2400" b="0" normalizeH="0" dirty="0">
@@ -7001,18 +6981,6 @@
                           <a:spcPct val="150000"/>
                         </a:lnSpc>
                       </a:pPr>
-                      <a:endParaRPr lang="en-US" altLang="ko-KR" sz="2400" b="0" normalizeH="0" dirty="0">
-                        <a:solidFill>
-                          <a:schemeClr val="bg1"/>
-                        </a:solidFill>
-                      </a:endParaRPr>
-                    </a:p>
-                    <a:p>
-                      <a:pPr algn="ctr" latinLnBrk="1">
-                        <a:lnSpc>
-                          <a:spcPct val="150000"/>
-                        </a:lnSpc>
-                      </a:pPr>
                       <a:r>
                         <a:rPr lang="ko-KR" altLang="en-US" sz="2400" b="0" normalizeH="0" dirty="0">
                           <a:solidFill>
@@ -7048,7 +7016,7 @@
                   </a:ext>
                 </a:extLst>
               </a:tr>
-              <a:tr h="954512">
+              <a:tr h="651658">
                 <a:tc vMerge="1">
                   <a:txBody>
                     <a:bodyPr/>
@@ -7147,18 +7115,6 @@
                         </a:solidFill>
                       </a:endParaRPr>
                     </a:p>
-                    <a:p>
-                      <a:pPr algn="ctr" latinLnBrk="1">
-                        <a:lnSpc>
-                          <a:spcPct val="150000"/>
-                        </a:lnSpc>
-                      </a:pPr>
-                      <a:endParaRPr lang="ko-KR" altLang="en-US" sz="2400" b="0" normalizeH="0" dirty="0">
-                        <a:solidFill>
-                          <a:schemeClr val="bg1"/>
-                        </a:solidFill>
-                      </a:endParaRPr>
-                    </a:p>
                   </a:txBody>
                   <a:tcPr>
                     <a:solidFill>
@@ -7172,7 +7128,7 @@
                   </a:ext>
                 </a:extLst>
               </a:tr>
-              <a:tr h="411292">
+              <a:tr h="332096">
                 <a:tc rowSpan="2">
                   <a:txBody>
                     <a:bodyPr/>
@@ -7241,7 +7197,7 @@
                   </a:ext>
                 </a:extLst>
               </a:tr>
-              <a:tr h="411292">
+              <a:tr h="332096">
                 <a:tc vMerge="1">
                   <a:txBody>
                     <a:bodyPr/>
@@ -7312,7 +7268,7 @@
                   </a:ext>
                 </a:extLst>
               </a:tr>
-              <a:tr h="477256">
+              <a:tr h="332096">
                 <a:tc rowSpan="2">
                   <a:txBody>
                     <a:bodyPr/>
@@ -7378,7 +7334,7 @@
                   </a:ext>
                 </a:extLst>
               </a:tr>
-              <a:tr h="477256">
+              <a:tr h="332096">
                 <a:tc vMerge="1">
                   <a:txBody>
                     <a:bodyPr/>
@@ -7442,6 +7398,22 @@
                       <a:r>
                         <a:rPr lang="ko-KR" altLang="en-US" sz="2400" normalizeH="0" baseline="0" dirty="0" err="1"/>
                         <a:t>미구현</a:t>
+                      </a:r>
+                      <a:endParaRPr lang="en-US" altLang="ko-KR" sz="2400" normalizeH="0" baseline="0" dirty="0"/>
+                    </a:p>
+                    <a:p>
+                      <a:pPr algn="ctr" latinLnBrk="1">
+                        <a:lnSpc>
+                          <a:spcPct val="150000"/>
+                        </a:lnSpc>
+                      </a:pPr>
+                      <a:r>
+                        <a:rPr lang="en-US" altLang="ko-KR" sz="2400" normalizeH="0" baseline="0" dirty="0"/>
+                        <a:t>(100%) </a:t>
+                      </a:r>
+                      <a:r>
+                        <a:rPr lang="ko-KR" altLang="en-US" sz="2400" normalizeH="0" baseline="0" dirty="0"/>
+                        <a:t>프레임워크에 이식 완료</a:t>
                       </a:r>
                       <a:endParaRPr lang="ko-KR" altLang="en-US" sz="2400" normalizeH="0" dirty="0"/>
                     </a:p>

</xml_diff>